<commit_message>
updated records until 31 August 2022 for ver.2
</commit_message>
<xml_diff>
--- a/imgs/image_design.pptx
+++ b/imgs/image_design.pptx
@@ -7,6 +7,7 @@
   <p:sldIdLst>
     <p:sldId id="256" r:id="rId2"/>
     <p:sldId id="257" r:id="rId3"/>
+    <p:sldId id="258" r:id="rId4"/>
   </p:sldIdLst>
   <p:sldSz cx="12192000" cy="6858000"/>
   <p:notesSz cx="6858000" cy="9144000"/>
@@ -262,7 +263,7 @@
           <a:p>
             <a:fld id="{8975B986-F77F-7F4B-B7EC-DEEB9F21C325}" type="datetimeFigureOut">
               <a:rPr lang="en-US" smtClean="0"/>
-              <a:t>8/28/22</a:t>
+              <a:t>9/2/22</a:t>
             </a:fld>
             <a:endParaRPr lang="en-US"/>
           </a:p>
@@ -462,7 +463,7 @@
           <a:p>
             <a:fld id="{8975B986-F77F-7F4B-B7EC-DEEB9F21C325}" type="datetimeFigureOut">
               <a:rPr lang="en-US" smtClean="0"/>
-              <a:t>8/28/22</a:t>
+              <a:t>9/2/22</a:t>
             </a:fld>
             <a:endParaRPr lang="en-US"/>
           </a:p>
@@ -672,7 +673,7 @@
           <a:p>
             <a:fld id="{8975B986-F77F-7F4B-B7EC-DEEB9F21C325}" type="datetimeFigureOut">
               <a:rPr lang="en-US" smtClean="0"/>
-              <a:t>8/28/22</a:t>
+              <a:t>9/2/22</a:t>
             </a:fld>
             <a:endParaRPr lang="en-US"/>
           </a:p>
@@ -872,7 +873,7 @@
           <a:p>
             <a:fld id="{8975B986-F77F-7F4B-B7EC-DEEB9F21C325}" type="datetimeFigureOut">
               <a:rPr lang="en-US" smtClean="0"/>
-              <a:t>8/28/22</a:t>
+              <a:t>9/2/22</a:t>
             </a:fld>
             <a:endParaRPr lang="en-US"/>
           </a:p>
@@ -1148,7 +1149,7 @@
           <a:p>
             <a:fld id="{8975B986-F77F-7F4B-B7EC-DEEB9F21C325}" type="datetimeFigureOut">
               <a:rPr lang="en-US" smtClean="0"/>
-              <a:t>8/28/22</a:t>
+              <a:t>9/2/22</a:t>
             </a:fld>
             <a:endParaRPr lang="en-US"/>
           </a:p>
@@ -1416,7 +1417,7 @@
           <a:p>
             <a:fld id="{8975B986-F77F-7F4B-B7EC-DEEB9F21C325}" type="datetimeFigureOut">
               <a:rPr lang="en-US" smtClean="0"/>
-              <a:t>8/28/22</a:t>
+              <a:t>9/2/22</a:t>
             </a:fld>
             <a:endParaRPr lang="en-US"/>
           </a:p>
@@ -1831,7 +1832,7 @@
           <a:p>
             <a:fld id="{8975B986-F77F-7F4B-B7EC-DEEB9F21C325}" type="datetimeFigureOut">
               <a:rPr lang="en-US" smtClean="0"/>
-              <a:t>8/28/22</a:t>
+              <a:t>9/2/22</a:t>
             </a:fld>
             <a:endParaRPr lang="en-US"/>
           </a:p>
@@ -1973,7 +1974,7 @@
           <a:p>
             <a:fld id="{8975B986-F77F-7F4B-B7EC-DEEB9F21C325}" type="datetimeFigureOut">
               <a:rPr lang="en-US" smtClean="0"/>
-              <a:t>8/28/22</a:t>
+              <a:t>9/2/22</a:t>
             </a:fld>
             <a:endParaRPr lang="en-US"/>
           </a:p>
@@ -2086,7 +2087,7 @@
           <a:p>
             <a:fld id="{8975B986-F77F-7F4B-B7EC-DEEB9F21C325}" type="datetimeFigureOut">
               <a:rPr lang="en-US" smtClean="0"/>
-              <a:t>8/28/22</a:t>
+              <a:t>9/2/22</a:t>
             </a:fld>
             <a:endParaRPr lang="en-US"/>
           </a:p>
@@ -2399,7 +2400,7 @@
           <a:p>
             <a:fld id="{8975B986-F77F-7F4B-B7EC-DEEB9F21C325}" type="datetimeFigureOut">
               <a:rPr lang="en-US" smtClean="0"/>
-              <a:t>8/28/22</a:t>
+              <a:t>9/2/22</a:t>
             </a:fld>
             <a:endParaRPr lang="en-US"/>
           </a:p>
@@ -2688,7 +2689,7 @@
           <a:p>
             <a:fld id="{8975B986-F77F-7F4B-B7EC-DEEB9F21C325}" type="datetimeFigureOut">
               <a:rPr lang="en-US" smtClean="0"/>
-              <a:t>8/28/22</a:t>
+              <a:t>9/2/22</a:t>
             </a:fld>
             <a:endParaRPr lang="en-US"/>
           </a:p>
@@ -2931,7 +2932,7 @@
           <a:p>
             <a:fld id="{8975B986-F77F-7F4B-B7EC-DEEB9F21C325}" type="datetimeFigureOut">
               <a:rPr lang="en-US" smtClean="0"/>
-              <a:t>8/28/22</a:t>
+              <a:t>9/2/22</a:t>
             </a:fld>
             <a:endParaRPr lang="en-US"/>
           </a:p>
@@ -4211,10 +4212,10 @@
       </p:grpSpPr>
       <p:grpSp>
         <p:nvGrpSpPr>
-          <p:cNvPr id="25" name="Group 24">
-            <a:extLst>
-              <a:ext uri="{FF2B5EF4-FFF2-40B4-BE49-F238E27FC236}">
-                <a16:creationId xmlns:a16="http://schemas.microsoft.com/office/drawing/2014/main" id="{E139D502-859F-8242-1E50-968D892BC924}"/>
+          <p:cNvPr id="19" name="Group 18">
+            <a:extLst>
+              <a:ext uri="{FF2B5EF4-FFF2-40B4-BE49-F238E27FC236}">
+                <a16:creationId xmlns:a16="http://schemas.microsoft.com/office/drawing/2014/main" id="{80593E46-608D-AF3B-2756-84AD8108A778}"/>
               </a:ext>
             </a:extLst>
           </p:cNvPr>
@@ -4223,18 +4224,72 @@
         </p:nvGrpSpPr>
         <p:grpSpPr>
           <a:xfrm>
-            <a:off x="1895119" y="3063874"/>
-            <a:ext cx="8401763" cy="730253"/>
-            <a:chOff x="2132772" y="2709000"/>
-            <a:chExt cx="8401763" cy="730253"/>
+            <a:off x="1458686" y="2813957"/>
+            <a:ext cx="9274628" cy="1230086"/>
+            <a:chOff x="1458686" y="2813957"/>
+            <a:chExt cx="9274628" cy="1230086"/>
           </a:xfrm>
         </p:grpSpPr>
+        <p:sp>
+          <p:nvSpPr>
+            <p:cNvPr id="2" name="Rectangle 1">
+              <a:extLst>
+                <a:ext uri="{FF2B5EF4-FFF2-40B4-BE49-F238E27FC236}">
+                  <a16:creationId xmlns:a16="http://schemas.microsoft.com/office/drawing/2014/main" id="{965FBFFF-7478-B8D2-6F5C-3CB85028B334}"/>
+                </a:ext>
+              </a:extLst>
+            </p:cNvPr>
+            <p:cNvSpPr/>
+            <p:nvPr/>
+          </p:nvSpPr>
+          <p:spPr>
+            <a:xfrm>
+              <a:off x="1458686" y="2813957"/>
+              <a:ext cx="9274628" cy="1230086"/>
+            </a:xfrm>
+            <a:prstGeom prst="rect">
+              <a:avLst/>
+            </a:prstGeom>
+            <a:solidFill>
+              <a:schemeClr val="bg1"/>
+            </a:solidFill>
+            <a:ln>
+              <a:solidFill>
+                <a:schemeClr val="bg1"/>
+              </a:solidFill>
+            </a:ln>
+          </p:spPr>
+          <p:style>
+            <a:lnRef idx="2">
+              <a:schemeClr val="accent1">
+                <a:shade val="50000"/>
+              </a:schemeClr>
+            </a:lnRef>
+            <a:fillRef idx="1">
+              <a:schemeClr val="accent1"/>
+            </a:fillRef>
+            <a:effectRef idx="0">
+              <a:schemeClr val="accent1"/>
+            </a:effectRef>
+            <a:fontRef idx="minor">
+              <a:schemeClr val="lt1"/>
+            </a:fontRef>
+          </p:style>
+          <p:txBody>
+            <a:bodyPr rtlCol="0" anchor="ctr"/>
+            <a:lstStyle/>
+            <a:p>
+              <a:pPr algn="ctr"/>
+              <a:endParaRPr lang="en-US"/>
+            </a:p>
+          </p:txBody>
+        </p:sp>
         <p:pic>
           <p:nvPicPr>
-            <p:cNvPr id="1026" name="Picture 2" descr="Centre for Health Protection - Wikipedia">
+            <p:cNvPr id="3" name="Picture 2" descr="Centre for Health Protection - Wikipedia">
               <a:extLst>
                 <a:ext uri="{FF2B5EF4-FFF2-40B4-BE49-F238E27FC236}">
-                  <a16:creationId xmlns:a16="http://schemas.microsoft.com/office/drawing/2014/main" id="{D2C47B68-7A1E-0672-3225-9A0EB0CF8AA1}"/>
+                  <a16:creationId xmlns:a16="http://schemas.microsoft.com/office/drawing/2014/main" id="{3F0B1F31-CB76-D719-9908-699A40BE2371}"/>
                 </a:ext>
               </a:extLst>
             </p:cNvPr>
@@ -4258,7 +4313,7 @@
           </p:blipFill>
           <p:spPr bwMode="auto">
             <a:xfrm>
-              <a:off x="2132772" y="2709000"/>
+              <a:off x="1895119" y="3063874"/>
               <a:ext cx="669833" cy="720000"/>
             </a:xfrm>
             <a:prstGeom prst="rect">
@@ -4278,10 +4333,10 @@
         </p:pic>
         <p:pic>
           <p:nvPicPr>
-            <p:cNvPr id="1028" name="Picture 4" descr="PDFが世界中で広く使われるようになった理由とは？ - GIGAZINE">
+            <p:cNvPr id="4" name="Picture 4" descr="PDFが世界中で広く使われるようになった理由とは？ - GIGAZINE">
               <a:extLst>
                 <a:ext uri="{FF2B5EF4-FFF2-40B4-BE49-F238E27FC236}">
-                  <a16:creationId xmlns:a16="http://schemas.microsoft.com/office/drawing/2014/main" id="{57F521CC-85E6-AFBA-A4DE-1E629591792A}"/>
+                  <a16:creationId xmlns:a16="http://schemas.microsoft.com/office/drawing/2014/main" id="{5A616603-C3B3-23F9-62AF-0300B162F469}"/>
                 </a:ext>
               </a:extLst>
             </p:cNvPr>
@@ -4303,7 +4358,7 @@
           </p:blipFill>
           <p:spPr bwMode="auto">
             <a:xfrm>
-              <a:off x="3903914" y="2719253"/>
+              <a:off x="3666261" y="3074127"/>
               <a:ext cx="593685" cy="720000"/>
             </a:xfrm>
             <a:prstGeom prst="rect">
@@ -4323,10 +4378,10 @@
         </p:pic>
         <p:pic>
           <p:nvPicPr>
-            <p:cNvPr id="1032" name="Picture 8" descr="Data filter, data filtering, data mining, database management, filter  tunnel icon - Download on Iconfinder">
+            <p:cNvPr id="5" name="Picture 8" descr="Data filter, data filtering, data mining, database management, filter  tunnel icon - Download on Iconfinder">
               <a:extLst>
                 <a:ext uri="{FF2B5EF4-FFF2-40B4-BE49-F238E27FC236}">
-                  <a16:creationId xmlns:a16="http://schemas.microsoft.com/office/drawing/2014/main" id="{53BD9384-D05A-1A80-3965-21C916F38095}"/>
+                  <a16:creationId xmlns:a16="http://schemas.microsoft.com/office/drawing/2014/main" id="{9DC60165-E555-4D2F-903D-749848FE3B5F}"/>
                 </a:ext>
               </a:extLst>
             </p:cNvPr>
@@ -4350,7 +4405,7 @@
           </p:blipFill>
           <p:spPr bwMode="auto">
             <a:xfrm>
-              <a:off x="5598908" y="2719253"/>
+              <a:off x="5361255" y="3074127"/>
               <a:ext cx="720000" cy="720000"/>
             </a:xfrm>
             <a:prstGeom prst="rect">
@@ -4370,10 +4425,10 @@
         </p:pic>
         <p:pic>
           <p:nvPicPr>
-            <p:cNvPr id="1034" name="Picture 10" descr="Microsoft Excel - Wikipedia">
+            <p:cNvPr id="6" name="Picture 10" descr="Microsoft Excel - Wikipedia">
               <a:extLst>
                 <a:ext uri="{FF2B5EF4-FFF2-40B4-BE49-F238E27FC236}">
-                  <a16:creationId xmlns:a16="http://schemas.microsoft.com/office/drawing/2014/main" id="{6056ABD3-351F-B65E-EBC1-7756649975DD}"/>
+                  <a16:creationId xmlns:a16="http://schemas.microsoft.com/office/drawing/2014/main" id="{814F5AEB-8513-D49D-2486-79EA81E91DFB}"/>
                 </a:ext>
               </a:extLst>
             </p:cNvPr>
@@ -4397,7 +4452,7 @@
           </p:blipFill>
           <p:spPr bwMode="auto">
             <a:xfrm>
-              <a:off x="7420217" y="2709000"/>
+              <a:off x="7182564" y="3063874"/>
               <a:ext cx="774167" cy="720000"/>
             </a:xfrm>
             <a:prstGeom prst="rect">
@@ -4417,10 +4472,10 @@
         </p:pic>
         <p:pic>
           <p:nvPicPr>
-            <p:cNvPr id="1038" name="Picture 14" descr="icon-tableau - ProMTO® | Project Portfolio Optimization">
+            <p:cNvPr id="8" name="Picture 14" descr="icon-tableau - ProMTO® | Project Portfolio Optimization">
               <a:extLst>
                 <a:ext uri="{FF2B5EF4-FFF2-40B4-BE49-F238E27FC236}">
-                  <a16:creationId xmlns:a16="http://schemas.microsoft.com/office/drawing/2014/main" id="{58EC966B-8931-DA4F-EAA7-319434A8E8F2}"/>
+                  <a16:creationId xmlns:a16="http://schemas.microsoft.com/office/drawing/2014/main" id="{59AB0F2D-FD70-398A-1077-30F93C92829E}"/>
                 </a:ext>
               </a:extLst>
             </p:cNvPr>
@@ -4442,7 +4497,7 @@
           </p:blipFill>
           <p:spPr bwMode="auto">
             <a:xfrm>
-              <a:off x="9295693" y="2719253"/>
+              <a:off x="9058040" y="3074127"/>
               <a:ext cx="1238842" cy="720000"/>
             </a:xfrm>
             <a:prstGeom prst="rect">
@@ -4462,10 +4517,10 @@
         </p:pic>
         <p:cxnSp>
           <p:nvCxnSpPr>
-            <p:cNvPr id="7" name="Straight Arrow Connector 6">
+            <p:cNvPr id="10" name="Straight Arrow Connector 9">
               <a:extLst>
                 <a:ext uri="{FF2B5EF4-FFF2-40B4-BE49-F238E27FC236}">
-                  <a16:creationId xmlns:a16="http://schemas.microsoft.com/office/drawing/2014/main" id="{9EB552B6-F61D-42A5-347B-B12EF86CA353}"/>
+                  <a16:creationId xmlns:a16="http://schemas.microsoft.com/office/drawing/2014/main" id="{03656BF3-A411-5CC5-71F0-382C28A797BE}"/>
                 </a:ext>
               </a:extLst>
             </p:cNvPr>
@@ -4474,7 +4529,7 @@
           </p:nvCxnSpPr>
           <p:spPr>
             <a:xfrm>
-              <a:off x="2991775" y="3069000"/>
+              <a:off x="2754122" y="3423874"/>
               <a:ext cx="719092" cy="0"/>
             </a:xfrm>
             <a:prstGeom prst="straightConnector1">
@@ -4501,10 +4556,10 @@
         </p:cxnSp>
         <p:cxnSp>
           <p:nvCxnSpPr>
-            <p:cNvPr id="9" name="Straight Arrow Connector 8">
+            <p:cNvPr id="11" name="Straight Arrow Connector 10">
               <a:extLst>
                 <a:ext uri="{FF2B5EF4-FFF2-40B4-BE49-F238E27FC236}">
-                  <a16:creationId xmlns:a16="http://schemas.microsoft.com/office/drawing/2014/main" id="{39787E1C-7D27-BF3D-4DB1-8B2F58E61591}"/>
+                  <a16:creationId xmlns:a16="http://schemas.microsoft.com/office/drawing/2014/main" id="{2F162FFF-4D9D-069A-BBFD-3DAA17C9B37B}"/>
                 </a:ext>
               </a:extLst>
             </p:cNvPr>
@@ -4513,7 +4568,7 @@
           </p:nvCxnSpPr>
           <p:spPr>
             <a:xfrm>
-              <a:off x="4742155" y="3079253"/>
+              <a:off x="4504502" y="3434127"/>
               <a:ext cx="719092" cy="0"/>
             </a:xfrm>
             <a:prstGeom prst="straightConnector1">
@@ -4540,10 +4595,10 @@
         </p:cxnSp>
         <p:cxnSp>
           <p:nvCxnSpPr>
-            <p:cNvPr id="13" name="Straight Arrow Connector 12">
+            <p:cNvPr id="12" name="Straight Arrow Connector 11">
               <a:extLst>
                 <a:ext uri="{FF2B5EF4-FFF2-40B4-BE49-F238E27FC236}">
-                  <a16:creationId xmlns:a16="http://schemas.microsoft.com/office/drawing/2014/main" id="{744FC570-FEA7-EACF-097F-42554DE0AF48}"/>
+                  <a16:creationId xmlns:a16="http://schemas.microsoft.com/office/drawing/2014/main" id="{81EB20AB-AA87-1631-61CD-28EBB77CA1CA}"/>
                 </a:ext>
               </a:extLst>
             </p:cNvPr>
@@ -4552,7 +4607,7 @@
           </p:nvCxnSpPr>
           <p:spPr>
             <a:xfrm>
-              <a:off x="6510291" y="3079253"/>
+              <a:off x="6272638" y="3434127"/>
               <a:ext cx="719092" cy="0"/>
             </a:xfrm>
             <a:prstGeom prst="straightConnector1">
@@ -4579,10 +4634,10 @@
         </p:cxnSp>
         <p:cxnSp>
           <p:nvCxnSpPr>
-            <p:cNvPr id="20" name="Straight Arrow Connector 19">
+            <p:cNvPr id="14" name="Straight Arrow Connector 13">
               <a:extLst>
                 <a:ext uri="{FF2B5EF4-FFF2-40B4-BE49-F238E27FC236}">
-                  <a16:creationId xmlns:a16="http://schemas.microsoft.com/office/drawing/2014/main" id="{75F8E55E-F526-D8C7-03B1-BA6D603EBB23}"/>
+                  <a16:creationId xmlns:a16="http://schemas.microsoft.com/office/drawing/2014/main" id="{8E75E82F-2A76-AD6B-249E-6F3332A7DBAC}"/>
                 </a:ext>
               </a:extLst>
             </p:cNvPr>
@@ -4591,7 +4646,7 @@
           </p:nvCxnSpPr>
           <p:spPr>
             <a:xfrm>
-              <a:off x="8447103" y="3069000"/>
+              <a:off x="8209450" y="3423874"/>
               <a:ext cx="719092" cy="0"/>
             </a:xfrm>
             <a:prstGeom prst="straightConnector1">
@@ -4618,10 +4673,10 @@
         </p:cxnSp>
         <p:sp>
           <p:nvSpPr>
-            <p:cNvPr id="21" name="TextBox 20">
+            <p:cNvPr id="15" name="TextBox 14">
               <a:extLst>
                 <a:ext uri="{FF2B5EF4-FFF2-40B4-BE49-F238E27FC236}">
-                  <a16:creationId xmlns:a16="http://schemas.microsoft.com/office/drawing/2014/main" id="{385443BF-6342-29A0-F6A1-5E803E2AF218}"/>
+                  <a16:creationId xmlns:a16="http://schemas.microsoft.com/office/drawing/2014/main" id="{590CB627-420A-38F2-7915-EC15DFE7705B}"/>
                 </a:ext>
               </a:extLst>
             </p:cNvPr>
@@ -4630,7 +4685,7 @@
           </p:nvSpPr>
           <p:spPr>
             <a:xfrm>
-              <a:off x="2932103" y="2727223"/>
+              <a:off x="2694450" y="3082097"/>
               <a:ext cx="830483" cy="276999"/>
             </a:xfrm>
             <a:prstGeom prst="rect">
@@ -4654,10 +4709,10 @@
         </p:sp>
         <p:sp>
           <p:nvSpPr>
-            <p:cNvPr id="22" name="TextBox 21">
+            <p:cNvPr id="16" name="TextBox 15">
               <a:extLst>
                 <a:ext uri="{FF2B5EF4-FFF2-40B4-BE49-F238E27FC236}">
-                  <a16:creationId xmlns:a16="http://schemas.microsoft.com/office/drawing/2014/main" id="{BD6D8060-C655-4943-075C-2A1F9DB0BF3A}"/>
+                  <a16:creationId xmlns:a16="http://schemas.microsoft.com/office/drawing/2014/main" id="{4D4E9B12-F13C-37FC-2E16-B56271048A35}"/>
                 </a:ext>
               </a:extLst>
             </p:cNvPr>
@@ -4666,7 +4721,7 @@
           </p:nvSpPr>
           <p:spPr>
             <a:xfrm>
-              <a:off x="4633741" y="2727224"/>
+              <a:off x="4396088" y="3082098"/>
               <a:ext cx="830483" cy="276999"/>
             </a:xfrm>
             <a:prstGeom prst="rect">
@@ -4690,10 +4745,10 @@
         </p:sp>
         <p:sp>
           <p:nvSpPr>
-            <p:cNvPr id="23" name="TextBox 22">
+            <p:cNvPr id="17" name="TextBox 16">
               <a:extLst>
                 <a:ext uri="{FF2B5EF4-FFF2-40B4-BE49-F238E27FC236}">
-                  <a16:creationId xmlns:a16="http://schemas.microsoft.com/office/drawing/2014/main" id="{A5248C22-E736-92E0-2D13-87B5E9087AE9}"/>
+                  <a16:creationId xmlns:a16="http://schemas.microsoft.com/office/drawing/2014/main" id="{07BCF201-8D9E-71BC-1C5A-1F7F491653FB}"/>
                 </a:ext>
               </a:extLst>
             </p:cNvPr>
@@ -4702,7 +4757,7 @@
           </p:nvSpPr>
           <p:spPr>
             <a:xfrm>
-              <a:off x="6454595" y="2728372"/>
+              <a:off x="6216942" y="3083246"/>
               <a:ext cx="830483" cy="276999"/>
             </a:xfrm>
             <a:prstGeom prst="rect">
@@ -4726,10 +4781,10 @@
         </p:sp>
         <p:sp>
           <p:nvSpPr>
-            <p:cNvPr id="24" name="TextBox 23">
+            <p:cNvPr id="18" name="TextBox 17">
               <a:extLst>
                 <a:ext uri="{FF2B5EF4-FFF2-40B4-BE49-F238E27FC236}">
-                  <a16:creationId xmlns:a16="http://schemas.microsoft.com/office/drawing/2014/main" id="{E10294CD-80FF-3A2F-8B67-3750F942917D}"/>
+                  <a16:creationId xmlns:a16="http://schemas.microsoft.com/office/drawing/2014/main" id="{5BE37BDA-AECC-B0C2-A42C-EDA68BD25FC8}"/>
                 </a:ext>
               </a:extLst>
             </p:cNvPr>
@@ -4738,7 +4793,7 @@
           </p:nvSpPr>
           <p:spPr>
             <a:xfrm>
-              <a:off x="8391407" y="2728946"/>
+              <a:off x="8153754" y="3083820"/>
               <a:ext cx="830483" cy="276999"/>
             </a:xfrm>
             <a:prstGeom prst="rect">
@@ -4766,6 +4821,545 @@
     <p:extLst>
       <p:ext uri="{BB962C8B-B14F-4D97-AF65-F5344CB8AC3E}">
         <p14:creationId xmlns:p14="http://schemas.microsoft.com/office/powerpoint/2010/main" val="1773134876"/>
+      </p:ext>
+    </p:extLst>
+  </p:cSld>
+  <p:clrMapOvr>
+    <a:masterClrMapping/>
+  </p:clrMapOvr>
+</p:sld>
+</file>
+
+<file path=ppt/slides/slide3.xml><?xml version="1.0" encoding="utf-8"?>
+<p:sld xmlns:a="http://schemas.openxmlformats.org/drawingml/2006/main" xmlns:r="http://schemas.openxmlformats.org/officeDocument/2006/relationships" xmlns:p="http://schemas.openxmlformats.org/presentationml/2006/main">
+  <p:cSld>
+    <p:spTree>
+      <p:nvGrpSpPr>
+        <p:cNvPr id="1" name=""/>
+        <p:cNvGrpSpPr/>
+        <p:nvPr/>
+      </p:nvGrpSpPr>
+      <p:grpSpPr>
+        <a:xfrm>
+          <a:off x="0" y="0"/>
+          <a:ext cx="0" cy="0"/>
+          <a:chOff x="0" y="0"/>
+          <a:chExt cx="0" cy="0"/>
+        </a:xfrm>
+      </p:grpSpPr>
+      <p:grpSp>
+        <p:nvGrpSpPr>
+          <p:cNvPr id="38" name="Group 37">
+            <a:extLst>
+              <a:ext uri="{FF2B5EF4-FFF2-40B4-BE49-F238E27FC236}">
+                <a16:creationId xmlns:a16="http://schemas.microsoft.com/office/drawing/2014/main" id="{D5C14F20-D7FD-A958-4EEC-D0C333D34BFD}"/>
+              </a:ext>
+            </a:extLst>
+          </p:cNvPr>
+          <p:cNvGrpSpPr/>
+          <p:nvPr/>
+        </p:nvGrpSpPr>
+        <p:grpSpPr>
+          <a:xfrm>
+            <a:off x="1763486" y="0"/>
+            <a:ext cx="8588828" cy="6858000"/>
+            <a:chOff x="1763486" y="0"/>
+            <a:chExt cx="8588828" cy="6858000"/>
+          </a:xfrm>
+        </p:grpSpPr>
+        <p:sp>
+          <p:nvSpPr>
+            <p:cNvPr id="37" name="Rectangle 36">
+              <a:extLst>
+                <a:ext uri="{FF2B5EF4-FFF2-40B4-BE49-F238E27FC236}">
+                  <a16:creationId xmlns:a16="http://schemas.microsoft.com/office/drawing/2014/main" id="{6A7FC698-86C7-2735-CAE4-783068C92DAC}"/>
+                </a:ext>
+              </a:extLst>
+            </p:cNvPr>
+            <p:cNvSpPr/>
+            <p:nvPr/>
+          </p:nvSpPr>
+          <p:spPr>
+            <a:xfrm>
+              <a:off x="1763486" y="0"/>
+              <a:ext cx="8425543" cy="6858000"/>
+            </a:xfrm>
+            <a:prstGeom prst="rect">
+              <a:avLst/>
+            </a:prstGeom>
+            <a:solidFill>
+              <a:schemeClr val="bg1"/>
+            </a:solidFill>
+            <a:ln>
+              <a:noFill/>
+            </a:ln>
+          </p:spPr>
+          <p:style>
+            <a:lnRef idx="2">
+              <a:schemeClr val="accent1">
+                <a:shade val="50000"/>
+              </a:schemeClr>
+            </a:lnRef>
+            <a:fillRef idx="1">
+              <a:schemeClr val="accent1"/>
+            </a:fillRef>
+            <a:effectRef idx="0">
+              <a:schemeClr val="accent1"/>
+            </a:effectRef>
+            <a:fontRef idx="minor">
+              <a:schemeClr val="lt1"/>
+            </a:fontRef>
+          </p:style>
+          <p:txBody>
+            <a:bodyPr rtlCol="0" anchor="ctr"/>
+            <a:lstStyle/>
+            <a:p>
+              <a:pPr algn="ctr"/>
+              <a:endParaRPr lang="en-US"/>
+            </a:p>
+          </p:txBody>
+        </p:sp>
+        <p:pic>
+          <p:nvPicPr>
+            <p:cNvPr id="7" name="Picture 6">
+              <a:extLst>
+                <a:ext uri="{FF2B5EF4-FFF2-40B4-BE49-F238E27FC236}">
+                  <a16:creationId xmlns:a16="http://schemas.microsoft.com/office/drawing/2014/main" id="{48E4C5EA-5DA3-6F83-74F8-14A8928B6435}"/>
+                </a:ext>
+              </a:extLst>
+            </p:cNvPr>
+            <p:cNvPicPr>
+              <a:picLocks noChangeAspect="1"/>
+            </p:cNvPicPr>
+            <p:nvPr/>
+          </p:nvPicPr>
+          <p:blipFill>
+            <a:blip r:embed="rId2"/>
+            <a:stretch>
+              <a:fillRect/>
+            </a:stretch>
+          </p:blipFill>
+          <p:spPr>
+            <a:xfrm>
+              <a:off x="1839686" y="0"/>
+              <a:ext cx="4898571" cy="6858000"/>
+            </a:xfrm>
+            <a:prstGeom prst="rect">
+              <a:avLst/>
+            </a:prstGeom>
+          </p:spPr>
+        </p:pic>
+        <p:sp>
+          <p:nvSpPr>
+            <p:cNvPr id="9" name="Rectangle 8">
+              <a:extLst>
+                <a:ext uri="{FF2B5EF4-FFF2-40B4-BE49-F238E27FC236}">
+                  <a16:creationId xmlns:a16="http://schemas.microsoft.com/office/drawing/2014/main" id="{E43CDD64-6C28-AB62-FD26-2FC1B79006F0}"/>
+                </a:ext>
+              </a:extLst>
+            </p:cNvPr>
+            <p:cNvSpPr/>
+            <p:nvPr/>
+          </p:nvSpPr>
+          <p:spPr>
+            <a:xfrm>
+              <a:off x="2383971" y="696686"/>
+              <a:ext cx="3799115" cy="642257"/>
+            </a:xfrm>
+            <a:prstGeom prst="rect">
+              <a:avLst/>
+            </a:prstGeom>
+            <a:noFill/>
+            <a:ln w="38100">
+              <a:solidFill>
+                <a:srgbClr val="FF0000"/>
+              </a:solidFill>
+              <a:prstDash val="dash"/>
+            </a:ln>
+          </p:spPr>
+          <p:style>
+            <a:lnRef idx="2">
+              <a:schemeClr val="accent1">
+                <a:shade val="50000"/>
+              </a:schemeClr>
+            </a:lnRef>
+            <a:fillRef idx="1">
+              <a:schemeClr val="accent1"/>
+            </a:fillRef>
+            <a:effectRef idx="0">
+              <a:schemeClr val="accent1"/>
+            </a:effectRef>
+            <a:fontRef idx="minor">
+              <a:schemeClr val="lt1"/>
+            </a:fontRef>
+          </p:style>
+          <p:txBody>
+            <a:bodyPr rtlCol="0" anchor="ctr"/>
+            <a:lstStyle/>
+            <a:p>
+              <a:pPr algn="ctr"/>
+              <a:endParaRPr lang="en-US"/>
+            </a:p>
+          </p:txBody>
+        </p:sp>
+        <p:cxnSp>
+          <p:nvCxnSpPr>
+            <p:cNvPr id="20" name="Elbow Connector 19">
+              <a:extLst>
+                <a:ext uri="{FF2B5EF4-FFF2-40B4-BE49-F238E27FC236}">
+                  <a16:creationId xmlns:a16="http://schemas.microsoft.com/office/drawing/2014/main" id="{F3B801A9-EBDD-E373-3C21-BE7CFCC683E9}"/>
+                </a:ext>
+              </a:extLst>
+            </p:cNvPr>
+            <p:cNvCxnSpPr>
+              <a:cxnSpLocks/>
+              <a:endCxn id="21" idx="1"/>
+            </p:cNvCxnSpPr>
+            <p:nvPr/>
+          </p:nvCxnSpPr>
+          <p:spPr>
+            <a:xfrm>
+              <a:off x="6183086" y="1017814"/>
+              <a:ext cx="1709057" cy="547692"/>
+            </a:xfrm>
+            <a:prstGeom prst="bentConnector3">
+              <a:avLst/>
+            </a:prstGeom>
+            <a:ln w="28575">
+              <a:solidFill>
+                <a:srgbClr val="FF0000"/>
+              </a:solidFill>
+              <a:tailEnd type="triangle"/>
+            </a:ln>
+          </p:spPr>
+          <p:style>
+            <a:lnRef idx="1">
+              <a:schemeClr val="accent1"/>
+            </a:lnRef>
+            <a:fillRef idx="0">
+              <a:schemeClr val="accent1"/>
+            </a:fillRef>
+            <a:effectRef idx="0">
+              <a:schemeClr val="accent1"/>
+            </a:effectRef>
+            <a:fontRef idx="minor">
+              <a:schemeClr val="tx1"/>
+            </a:fontRef>
+          </p:style>
+        </p:cxnSp>
+        <p:sp>
+          <p:nvSpPr>
+            <p:cNvPr id="21" name="TextBox 20">
+              <a:extLst>
+                <a:ext uri="{FF2B5EF4-FFF2-40B4-BE49-F238E27FC236}">
+                  <a16:creationId xmlns:a16="http://schemas.microsoft.com/office/drawing/2014/main" id="{681BB92E-E082-CD2D-67A4-D5686A4B1FF2}"/>
+                </a:ext>
+              </a:extLst>
+            </p:cNvPr>
+            <p:cNvSpPr txBox="1"/>
+            <p:nvPr/>
+          </p:nvSpPr>
+          <p:spPr>
+            <a:xfrm>
+              <a:off x="7892143" y="1242340"/>
+              <a:ext cx="2460171" cy="646331"/>
+            </a:xfrm>
+            <a:prstGeom prst="rect">
+              <a:avLst/>
+            </a:prstGeom>
+            <a:noFill/>
+          </p:spPr>
+          <p:txBody>
+            <a:bodyPr wrap="square" rtlCol="0">
+              <a:spAutoFit/>
+            </a:bodyPr>
+            <a:lstStyle/>
+            <a:p>
+              <a:r>
+                <a:rPr lang="en-US" dirty="0"/>
+                <a:t>Dragon Tiger Billboard description</a:t>
+              </a:r>
+            </a:p>
+          </p:txBody>
+        </p:sp>
+        <p:sp>
+          <p:nvSpPr>
+            <p:cNvPr id="22" name="Rectangle 21">
+              <a:extLst>
+                <a:ext uri="{FF2B5EF4-FFF2-40B4-BE49-F238E27FC236}">
+                  <a16:creationId xmlns:a16="http://schemas.microsoft.com/office/drawing/2014/main" id="{A3717278-3555-CA90-330D-BE8A798BA706}"/>
+                </a:ext>
+              </a:extLst>
+            </p:cNvPr>
+            <p:cNvSpPr/>
+            <p:nvPr/>
+          </p:nvSpPr>
+          <p:spPr>
+            <a:xfrm>
+              <a:off x="2046515" y="1480458"/>
+              <a:ext cx="4441372" cy="3439885"/>
+            </a:xfrm>
+            <a:prstGeom prst="rect">
+              <a:avLst/>
+            </a:prstGeom>
+            <a:noFill/>
+            <a:ln w="38100">
+              <a:solidFill>
+                <a:schemeClr val="accent5"/>
+              </a:solidFill>
+              <a:prstDash val="dash"/>
+            </a:ln>
+          </p:spPr>
+          <p:style>
+            <a:lnRef idx="2">
+              <a:schemeClr val="accent1">
+                <a:shade val="50000"/>
+              </a:schemeClr>
+            </a:lnRef>
+            <a:fillRef idx="1">
+              <a:schemeClr val="accent1"/>
+            </a:fillRef>
+            <a:effectRef idx="0">
+              <a:schemeClr val="accent1"/>
+            </a:effectRef>
+            <a:fontRef idx="minor">
+              <a:schemeClr val="lt1"/>
+            </a:fontRef>
+          </p:style>
+          <p:txBody>
+            <a:bodyPr rtlCol="0" anchor="ctr"/>
+            <a:lstStyle/>
+            <a:p>
+              <a:pPr algn="ctr"/>
+              <a:endParaRPr lang="en-US"/>
+            </a:p>
+          </p:txBody>
+        </p:sp>
+        <p:cxnSp>
+          <p:nvCxnSpPr>
+            <p:cNvPr id="27" name="Straight Arrow Connector 26">
+              <a:extLst>
+                <a:ext uri="{FF2B5EF4-FFF2-40B4-BE49-F238E27FC236}">
+                  <a16:creationId xmlns:a16="http://schemas.microsoft.com/office/drawing/2014/main" id="{44A45B5B-1F8D-C6A7-E47E-8DBA0F706B58}"/>
+                </a:ext>
+              </a:extLst>
+            </p:cNvPr>
+            <p:cNvCxnSpPr>
+              <a:cxnSpLocks/>
+              <a:stCxn id="22" idx="3"/>
+              <a:endCxn id="28" idx="1"/>
+            </p:cNvCxnSpPr>
+            <p:nvPr/>
+          </p:nvCxnSpPr>
+          <p:spPr>
+            <a:xfrm flipV="1">
+              <a:off x="6487887" y="3200400"/>
+              <a:ext cx="1404256" cy="1"/>
+            </a:xfrm>
+            <a:prstGeom prst="straightConnector1">
+              <a:avLst/>
+            </a:prstGeom>
+            <a:ln w="28575">
+              <a:solidFill>
+                <a:schemeClr val="accent5"/>
+              </a:solidFill>
+              <a:tailEnd type="triangle"/>
+            </a:ln>
+          </p:spPr>
+          <p:style>
+            <a:lnRef idx="1">
+              <a:schemeClr val="accent1"/>
+            </a:lnRef>
+            <a:fillRef idx="0">
+              <a:schemeClr val="accent1"/>
+            </a:fillRef>
+            <a:effectRef idx="0">
+              <a:schemeClr val="accent1"/>
+            </a:effectRef>
+            <a:fontRef idx="minor">
+              <a:schemeClr val="tx1"/>
+            </a:fontRef>
+          </p:style>
+        </p:cxnSp>
+        <p:sp>
+          <p:nvSpPr>
+            <p:cNvPr id="28" name="TextBox 27">
+              <a:extLst>
+                <a:ext uri="{FF2B5EF4-FFF2-40B4-BE49-F238E27FC236}">
+                  <a16:creationId xmlns:a16="http://schemas.microsoft.com/office/drawing/2014/main" id="{1D3A872A-D3C7-5960-F83C-663A403DD192}"/>
+                </a:ext>
+              </a:extLst>
+            </p:cNvPr>
+            <p:cNvSpPr txBox="1"/>
+            <p:nvPr/>
+          </p:nvSpPr>
+          <p:spPr>
+            <a:xfrm>
+              <a:off x="7892143" y="2738735"/>
+              <a:ext cx="2460171" cy="923330"/>
+            </a:xfrm>
+            <a:prstGeom prst="rect">
+              <a:avLst/>
+            </a:prstGeom>
+            <a:noFill/>
+          </p:spPr>
+          <p:txBody>
+            <a:bodyPr wrap="square" rtlCol="0">
+              <a:spAutoFit/>
+            </a:bodyPr>
+            <a:lstStyle/>
+            <a:p>
+              <a:r>
+                <a:rPr lang="en-US" dirty="0"/>
+                <a:t>Top 10 specified </a:t>
+              </a:r>
+              <a:r>
+                <a:rPr lang="en-HK" dirty="0"/>
+                <a:t>premises listed on CTN according to its area</a:t>
+              </a:r>
+            </a:p>
+          </p:txBody>
+        </p:sp>
+        <p:sp>
+          <p:nvSpPr>
+            <p:cNvPr id="29" name="Rectangle 28">
+              <a:extLst>
+                <a:ext uri="{FF2B5EF4-FFF2-40B4-BE49-F238E27FC236}">
+                  <a16:creationId xmlns:a16="http://schemas.microsoft.com/office/drawing/2014/main" id="{1E2A3998-E98E-722D-06A7-8735F762622F}"/>
+                </a:ext>
+              </a:extLst>
+            </p:cNvPr>
+            <p:cNvSpPr/>
+            <p:nvPr/>
+          </p:nvSpPr>
+          <p:spPr>
+            <a:xfrm>
+              <a:off x="2144486" y="5023758"/>
+              <a:ext cx="4343401" cy="1398815"/>
+            </a:xfrm>
+            <a:prstGeom prst="rect">
+              <a:avLst/>
+            </a:prstGeom>
+            <a:noFill/>
+            <a:ln w="38100">
+              <a:solidFill>
+                <a:schemeClr val="accent6"/>
+              </a:solidFill>
+              <a:prstDash val="dash"/>
+            </a:ln>
+          </p:spPr>
+          <p:style>
+            <a:lnRef idx="2">
+              <a:schemeClr val="accent1">
+                <a:shade val="50000"/>
+              </a:schemeClr>
+            </a:lnRef>
+            <a:fillRef idx="1">
+              <a:schemeClr val="accent1"/>
+            </a:fillRef>
+            <a:effectRef idx="0">
+              <a:schemeClr val="accent1"/>
+            </a:effectRef>
+            <a:fontRef idx="minor">
+              <a:schemeClr val="lt1"/>
+            </a:fontRef>
+          </p:style>
+          <p:txBody>
+            <a:bodyPr rtlCol="0" anchor="ctr"/>
+            <a:lstStyle/>
+            <a:p>
+              <a:pPr algn="ctr"/>
+              <a:endParaRPr lang="en-US"/>
+            </a:p>
+          </p:txBody>
+        </p:sp>
+        <p:cxnSp>
+          <p:nvCxnSpPr>
+            <p:cNvPr id="31" name="Elbow Connector 30">
+              <a:extLst>
+                <a:ext uri="{FF2B5EF4-FFF2-40B4-BE49-F238E27FC236}">
+                  <a16:creationId xmlns:a16="http://schemas.microsoft.com/office/drawing/2014/main" id="{97EE9DC8-2B50-89F5-E89C-CC322E71BB68}"/>
+                </a:ext>
+              </a:extLst>
+            </p:cNvPr>
+            <p:cNvCxnSpPr>
+              <a:cxnSpLocks/>
+              <a:stCxn id="29" idx="3"/>
+              <a:endCxn id="32" idx="1"/>
+            </p:cNvCxnSpPr>
+            <p:nvPr/>
+          </p:nvCxnSpPr>
+          <p:spPr>
+            <a:xfrm flipV="1">
+              <a:off x="6487887" y="5153995"/>
+              <a:ext cx="1404255" cy="569171"/>
+            </a:xfrm>
+            <a:prstGeom prst="bentConnector3">
+              <a:avLst/>
+            </a:prstGeom>
+            <a:ln w="28575">
+              <a:solidFill>
+                <a:schemeClr val="accent6"/>
+              </a:solidFill>
+              <a:tailEnd type="triangle"/>
+            </a:ln>
+          </p:spPr>
+          <p:style>
+            <a:lnRef idx="1">
+              <a:schemeClr val="accent1"/>
+            </a:lnRef>
+            <a:fillRef idx="0">
+              <a:schemeClr val="accent1"/>
+            </a:fillRef>
+            <a:effectRef idx="0">
+              <a:schemeClr val="accent1"/>
+            </a:effectRef>
+            <a:fontRef idx="minor">
+              <a:schemeClr val="tx1"/>
+            </a:fontRef>
+          </p:style>
+        </p:cxnSp>
+        <p:sp>
+          <p:nvSpPr>
+            <p:cNvPr id="32" name="TextBox 31">
+              <a:extLst>
+                <a:ext uri="{FF2B5EF4-FFF2-40B4-BE49-F238E27FC236}">
+                  <a16:creationId xmlns:a16="http://schemas.microsoft.com/office/drawing/2014/main" id="{BAE9540C-C85C-5F55-6A27-83CD16E60009}"/>
+                </a:ext>
+              </a:extLst>
+            </p:cNvPr>
+            <p:cNvSpPr txBox="1"/>
+            <p:nvPr/>
+          </p:nvSpPr>
+          <p:spPr>
+            <a:xfrm>
+              <a:off x="7892142" y="4692330"/>
+              <a:ext cx="2460171" cy="923330"/>
+            </a:xfrm>
+            <a:prstGeom prst="rect">
+              <a:avLst/>
+            </a:prstGeom>
+            <a:noFill/>
+          </p:spPr>
+          <p:txBody>
+            <a:bodyPr wrap="square" rtlCol="0">
+              <a:spAutoFit/>
+            </a:bodyPr>
+            <a:lstStyle/>
+            <a:p>
+              <a:r>
+                <a:rPr lang="en-US" dirty="0"/>
+                <a:t>A Map showing the location of each specified premises</a:t>
+              </a:r>
+              <a:endParaRPr lang="en-HK" dirty="0"/>
+            </a:p>
+          </p:txBody>
+        </p:sp>
+      </p:grpSp>
+    </p:spTree>
+    <p:extLst>
+      <p:ext uri="{BB962C8B-B14F-4D97-AF65-F5344CB8AC3E}">
+        <p14:creationId xmlns:p14="http://schemas.microsoft.com/office/powerpoint/2010/main" val="1271606804"/>
       </p:ext>
     </p:extLst>
   </p:cSld>

</xml_diff>